<commit_message>
Update 2021-11-08 brng_stoc_snn.py 발표자료.pptx
</commit_message>
<xml_diff>
--- a/files/presentation/ppt/brng_stoc_snn.py 발표/2021-11-08 brng_stoc_snn.py 발표자료.pptx
+++ b/files/presentation/ppt/brng_stoc_snn.py 발표/2021-11-08 brng_stoc_snn.py 발표자료.pptx
@@ -216,7 +216,7 @@
           <a:p>
             <a:fld id="{38874351-E425-459F-98D5-9BCDDC5A3E66}" type="datetimeFigureOut">
               <a:rPr lang="ko-KR" altLang="en-US" smtClean="0"/>
-              <a:t>2021-11-06</a:t>
+              <a:t>2021-11-08</a:t>
             </a:fld>
             <a:endParaRPr lang="ko-KR" altLang="en-US"/>
           </a:p>
@@ -1228,7 +1228,7 @@
           <a:p>
             <a:fld id="{0DEEF2AD-A5B8-4881-A716-76B85BBF1017}" type="datetimeFigureOut">
               <a:rPr lang="ko-KR" altLang="en-US" smtClean="0"/>
-              <a:t>2021-11-06</a:t>
+              <a:t>2021-11-08</a:t>
             </a:fld>
             <a:endParaRPr lang="ko-KR" altLang="en-US"/>
           </a:p>
@@ -1479,7 +1479,7 @@
           <a:p>
             <a:fld id="{0DEEF2AD-A5B8-4881-A716-76B85BBF1017}" type="datetimeFigureOut">
               <a:rPr lang="ko-KR" altLang="en-US" smtClean="0"/>
-              <a:t>2021-11-06</a:t>
+              <a:t>2021-11-08</a:t>
             </a:fld>
             <a:endParaRPr lang="ko-KR" altLang="en-US"/>
           </a:p>
@@ -1793,7 +1793,7 @@
           <a:p>
             <a:fld id="{0DEEF2AD-A5B8-4881-A716-76B85BBF1017}" type="datetimeFigureOut">
               <a:rPr lang="ko-KR" altLang="en-US" smtClean="0"/>
-              <a:t>2021-11-06</a:t>
+              <a:t>2021-11-08</a:t>
             </a:fld>
             <a:endParaRPr lang="ko-KR" altLang="en-US"/>
           </a:p>
@@ -2126,7 +2126,7 @@
           <a:p>
             <a:fld id="{0DEEF2AD-A5B8-4881-A716-76B85BBF1017}" type="datetimeFigureOut">
               <a:rPr lang="ko-KR" altLang="en-US" smtClean="0"/>
-              <a:t>2021-11-06</a:t>
+              <a:t>2021-11-08</a:t>
             </a:fld>
             <a:endParaRPr lang="ko-KR" altLang="en-US"/>
           </a:p>
@@ -2440,7 +2440,7 @@
           <a:p>
             <a:fld id="{0DEEF2AD-A5B8-4881-A716-76B85BBF1017}" type="datetimeFigureOut">
               <a:rPr lang="ko-KR" altLang="en-US" smtClean="0"/>
-              <a:t>2021-11-06</a:t>
+              <a:t>2021-11-08</a:t>
             </a:fld>
             <a:endParaRPr lang="ko-KR" altLang="en-US"/>
           </a:p>
@@ -2833,7 +2833,7 @@
           <a:p>
             <a:fld id="{0DEEF2AD-A5B8-4881-A716-76B85BBF1017}" type="datetimeFigureOut">
               <a:rPr lang="ko-KR" altLang="en-US" smtClean="0"/>
-              <a:t>2021-11-06</a:t>
+              <a:t>2021-11-08</a:t>
             </a:fld>
             <a:endParaRPr lang="ko-KR" altLang="en-US"/>
           </a:p>
@@ -3003,7 +3003,7 @@
           <a:p>
             <a:fld id="{0DEEF2AD-A5B8-4881-A716-76B85BBF1017}" type="datetimeFigureOut">
               <a:rPr lang="ko-KR" altLang="en-US" smtClean="0"/>
-              <a:t>2021-11-06</a:t>
+              <a:t>2021-11-08</a:t>
             </a:fld>
             <a:endParaRPr lang="ko-KR" altLang="en-US"/>
           </a:p>
@@ -3183,7 +3183,7 @@
           <a:p>
             <a:fld id="{0DEEF2AD-A5B8-4881-A716-76B85BBF1017}" type="datetimeFigureOut">
               <a:rPr lang="ko-KR" altLang="en-US" smtClean="0"/>
-              <a:t>2021-11-06</a:t>
+              <a:t>2021-11-08</a:t>
             </a:fld>
             <a:endParaRPr lang="ko-KR" altLang="en-US"/>
           </a:p>
@@ -3353,7 +3353,7 @@
           <a:p>
             <a:fld id="{0DEEF2AD-A5B8-4881-A716-76B85BBF1017}" type="datetimeFigureOut">
               <a:rPr lang="ko-KR" altLang="en-US" smtClean="0"/>
-              <a:t>2021-11-06</a:t>
+              <a:t>2021-11-08</a:t>
             </a:fld>
             <a:endParaRPr lang="ko-KR" altLang="en-US"/>
           </a:p>
@@ -3600,7 +3600,7 @@
           <a:p>
             <a:fld id="{0DEEF2AD-A5B8-4881-A716-76B85BBF1017}" type="datetimeFigureOut">
               <a:rPr lang="ko-KR" altLang="en-US" smtClean="0"/>
-              <a:t>2021-11-06</a:t>
+              <a:t>2021-11-08</a:t>
             </a:fld>
             <a:endParaRPr lang="ko-KR" altLang="en-US"/>
           </a:p>
@@ -3832,7 +3832,7 @@
           <a:p>
             <a:fld id="{0DEEF2AD-A5B8-4881-A716-76B85BBF1017}" type="datetimeFigureOut">
               <a:rPr lang="ko-KR" altLang="en-US" smtClean="0"/>
-              <a:t>2021-11-06</a:t>
+              <a:t>2021-11-08</a:t>
             </a:fld>
             <a:endParaRPr lang="ko-KR" altLang="en-US"/>
           </a:p>
@@ -4206,7 +4206,7 @@
           <a:p>
             <a:fld id="{0DEEF2AD-A5B8-4881-A716-76B85BBF1017}" type="datetimeFigureOut">
               <a:rPr lang="ko-KR" altLang="en-US" smtClean="0"/>
-              <a:t>2021-11-06</a:t>
+              <a:t>2021-11-08</a:t>
             </a:fld>
             <a:endParaRPr lang="ko-KR" altLang="en-US"/>
           </a:p>
@@ -4329,7 +4329,7 @@
           <a:p>
             <a:fld id="{0DEEF2AD-A5B8-4881-A716-76B85BBF1017}" type="datetimeFigureOut">
               <a:rPr lang="ko-KR" altLang="en-US" smtClean="0"/>
-              <a:t>2021-11-06</a:t>
+              <a:t>2021-11-08</a:t>
             </a:fld>
             <a:endParaRPr lang="ko-KR" altLang="en-US"/>
           </a:p>
@@ -4424,7 +4424,7 @@
           <a:p>
             <a:fld id="{0DEEF2AD-A5B8-4881-A716-76B85BBF1017}" type="datetimeFigureOut">
               <a:rPr lang="ko-KR" altLang="en-US" smtClean="0"/>
-              <a:t>2021-11-06</a:t>
+              <a:t>2021-11-08</a:t>
             </a:fld>
             <a:endParaRPr lang="ko-KR" altLang="en-US"/>
           </a:p>
@@ -4679,7 +4679,7 @@
           <a:p>
             <a:fld id="{0DEEF2AD-A5B8-4881-A716-76B85BBF1017}" type="datetimeFigureOut">
               <a:rPr lang="ko-KR" altLang="en-US" smtClean="0"/>
-              <a:t>2021-11-06</a:t>
+              <a:t>2021-11-08</a:t>
             </a:fld>
             <a:endParaRPr lang="ko-KR" altLang="en-US"/>
           </a:p>
@@ -4984,7 +4984,7 @@
           <a:p>
             <a:fld id="{0DEEF2AD-A5B8-4881-A716-76B85BBF1017}" type="datetimeFigureOut">
               <a:rPr lang="ko-KR" altLang="en-US" smtClean="0"/>
-              <a:t>2021-11-06</a:t>
+              <a:t>2021-11-08</a:t>
             </a:fld>
             <a:endParaRPr lang="ko-KR" altLang="en-US"/>
           </a:p>
@@ -5686,7 +5686,7 @@
           <a:p>
             <a:fld id="{0DEEF2AD-A5B8-4881-A716-76B85BBF1017}" type="datetimeFigureOut">
               <a:rPr lang="ko-KR" altLang="en-US" smtClean="0"/>
-              <a:t>2021-11-06</a:t>
+              <a:t>2021-11-08</a:t>
             </a:fld>
             <a:endParaRPr lang="ko-KR" altLang="en-US"/>
           </a:p>
@@ -6320,6 +6320,36 @@
           <a:chExt cx="0" cy="0"/>
         </a:xfrm>
       </p:grpSpPr>
+      <p:pic>
+        <p:nvPicPr>
+          <p:cNvPr id="3" name="그림 2">
+            <a:extLst>
+              <a:ext uri="{FF2B5EF4-FFF2-40B4-BE49-F238E27FC236}">
+                <a16:creationId xmlns:a16="http://schemas.microsoft.com/office/drawing/2014/main" id="{C5A520C4-EF50-4AC4-94C9-92018FBE3E88}"/>
+              </a:ext>
+            </a:extLst>
+          </p:cNvPr>
+          <p:cNvPicPr>
+            <a:picLocks noChangeAspect="1"/>
+          </p:cNvPicPr>
+          <p:nvPr/>
+        </p:nvPicPr>
+        <p:blipFill>
+          <a:blip r:embed="rId2"/>
+          <a:stretch>
+            <a:fillRect/>
+          </a:stretch>
+        </p:blipFill>
+        <p:spPr>
+          <a:xfrm>
+            <a:off x="2461705" y="532996"/>
+            <a:ext cx="7268589" cy="5792008"/>
+          </a:xfrm>
+          <a:prstGeom prst="rect">
+            <a:avLst/>
+          </a:prstGeom>
+        </p:spPr>
+      </p:pic>
     </p:spTree>
     <p:extLst>
       <p:ext uri="{BB962C8B-B14F-4D97-AF65-F5344CB8AC3E}">
@@ -6830,6 +6860,207 @@
           <a:chExt cx="0" cy="0"/>
         </a:xfrm>
       </p:grpSpPr>
+      <p:sp>
+        <p:nvSpPr>
+          <p:cNvPr id="2" name="TextBox 1">
+            <a:extLst>
+              <a:ext uri="{FF2B5EF4-FFF2-40B4-BE49-F238E27FC236}">
+                <a16:creationId xmlns:a16="http://schemas.microsoft.com/office/drawing/2014/main" id="{C0560F61-67ED-4BB9-88B4-E56185872793}"/>
+              </a:ext>
+            </a:extLst>
+          </p:cNvPr>
+          <p:cNvSpPr txBox="1"/>
+          <p:nvPr/>
+        </p:nvSpPr>
+        <p:spPr>
+          <a:xfrm>
+            <a:off x="1326629" y="1027944"/>
+            <a:ext cx="9538741" cy="4401205"/>
+          </a:xfrm>
+          <a:prstGeom prst="rect">
+            <a:avLst/>
+          </a:prstGeom>
+          <a:noFill/>
+        </p:spPr>
+        <p:txBody>
+          <a:bodyPr wrap="square" rtlCol="0">
+            <a:spAutoFit/>
+          </a:bodyPr>
+          <a:lstStyle/>
+          <a:p>
+            <a:pPr marL="342900" indent="-342900">
+              <a:buAutoNum type="arabicPeriod"/>
+            </a:pPr>
+            <a:r>
+              <a:rPr lang="en-US" altLang="ko-KR" sz="2800" dirty="0" err="1"/>
+              <a:t>Diehl&amp;Cook</a:t>
+            </a:r>
+            <a:r>
+              <a:rPr lang="ko-KR" altLang="en-US" sz="2800" dirty="0"/>
+              <a:t>이 작성한 코드</a:t>
+            </a:r>
+            <a:endParaRPr lang="en-US" altLang="ko-KR" sz="2800" dirty="0"/>
+          </a:p>
+          <a:p>
+            <a:pPr lvl="1"/>
+            <a:r>
+              <a:rPr lang="en-US" altLang="ko-KR" sz="2800" dirty="0"/>
+              <a:t>- </a:t>
+            </a:r>
+            <a:r>
+              <a:rPr lang="ko-KR" altLang="en-US" sz="2800" dirty="0"/>
+              <a:t>우분투에서 돌렸으나 컴파일 </a:t>
+            </a:r>
+            <a:r>
+              <a:rPr lang="ko-KR" altLang="en-US" sz="2800" dirty="0" err="1"/>
+              <a:t>에러남</a:t>
+            </a:r>
+            <a:endParaRPr lang="en-US" altLang="ko-KR" sz="2800" dirty="0"/>
+          </a:p>
+          <a:p>
+            <a:pPr marL="342900" indent="-342900">
+              <a:buAutoNum type="arabicPeriod"/>
+            </a:pPr>
+            <a:r>
+              <a:rPr lang="ko-KR" altLang="en-US" sz="2800" dirty="0"/>
+              <a:t>교수님께서 주신 코드</a:t>
+            </a:r>
+            <a:endParaRPr lang="en-US" altLang="ko-KR" sz="2800" dirty="0"/>
+          </a:p>
+          <a:p>
+            <a:pPr lvl="1"/>
+            <a:r>
+              <a:rPr lang="en-US" altLang="ko-KR" sz="2800" dirty="0"/>
+              <a:t>- </a:t>
+            </a:r>
+            <a:r>
+              <a:rPr lang="ko-KR" altLang="en-US" sz="2800" dirty="0"/>
+              <a:t>우분투에서 돌렸으나 </a:t>
+            </a:r>
+            <a:r>
+              <a:rPr lang="en-US" altLang="ko-KR" sz="2800" dirty="0" err="1"/>
+              <a:t>DimensionMismatchError</a:t>
+            </a:r>
+            <a:endParaRPr lang="en-US" altLang="ko-KR" sz="2800" dirty="0"/>
+          </a:p>
+          <a:p>
+            <a:pPr marL="342900" indent="-342900">
+              <a:buAutoNum type="arabicPeriod"/>
+            </a:pPr>
+            <a:r>
+              <a:rPr lang="ko-KR" altLang="en-US" sz="2800" dirty="0"/>
+              <a:t>교수님께서 주신 코드에서 식 같게 문법만 바꾼 코드</a:t>
+            </a:r>
+            <a:endParaRPr lang="en-US" altLang="ko-KR" sz="2800" dirty="0"/>
+          </a:p>
+          <a:p>
+            <a:pPr lvl="1"/>
+            <a:r>
+              <a:rPr lang="en-US" altLang="ko-KR" sz="2800" dirty="0"/>
+              <a:t>- </a:t>
+            </a:r>
+            <a:r>
+              <a:rPr lang="en-US" altLang="ko-KR" sz="2800" dirty="0" err="1"/>
+              <a:t>Sympy</a:t>
+            </a:r>
+            <a:r>
+              <a:rPr lang="en-US" altLang="ko-KR" sz="2800" dirty="0"/>
+              <a:t> expression Error</a:t>
+            </a:r>
+          </a:p>
+          <a:p>
+            <a:pPr marL="342900" indent="-342900">
+              <a:buAutoNum type="arabicPeriod"/>
+            </a:pPr>
+            <a:r>
+              <a:rPr lang="ko-KR" altLang="en-US" sz="2800" dirty="0"/>
+              <a:t>교수님께서 주신 코드에서 식</a:t>
+            </a:r>
+            <a:r>
+              <a:rPr lang="en-US" altLang="ko-KR" sz="2800" dirty="0"/>
+              <a:t>, </a:t>
+            </a:r>
+            <a:r>
+              <a:rPr lang="ko-KR" altLang="en-US" sz="2800" dirty="0"/>
+              <a:t>문법 바꾼 코드</a:t>
+            </a:r>
+            <a:endParaRPr lang="en-US" altLang="ko-KR" sz="2800" dirty="0"/>
+          </a:p>
+          <a:p>
+            <a:pPr lvl="1"/>
+            <a:r>
+              <a:rPr lang="en-US" altLang="ko-KR" sz="2800" dirty="0"/>
+              <a:t>- </a:t>
+            </a:r>
+            <a:r>
+              <a:rPr lang="en-US" altLang="ko-KR" sz="2800" dirty="0" err="1"/>
+              <a:t>rowdata</a:t>
+            </a:r>
+            <a:r>
+              <a:rPr lang="en-US" altLang="ko-KR" sz="2800" dirty="0"/>
+              <a:t>, </a:t>
+            </a:r>
+            <a:r>
+              <a:rPr lang="en-US" altLang="ko-KR" sz="2800" dirty="0" err="1"/>
+              <a:t>rowj</a:t>
+            </a:r>
+            <a:r>
+              <a:rPr lang="en-US" altLang="ko-KR" sz="2800" dirty="0"/>
+              <a:t>, shape</a:t>
+            </a:r>
+            <a:r>
+              <a:rPr lang="ko-KR" altLang="en-US" sz="2800" dirty="0"/>
+              <a:t>부분에서 에러</a:t>
+            </a:r>
+            <a:endParaRPr lang="en-US" altLang="ko-KR" sz="2800" dirty="0"/>
+          </a:p>
+          <a:p>
+            <a:pPr marL="342900" indent="-342900">
+              <a:buAutoNum type="arabicPeriod"/>
+            </a:pPr>
+            <a:r>
+              <a:rPr lang="en-US" altLang="ko-KR" sz="2800" dirty="0" err="1"/>
+              <a:t>Diehl&amp;Cook</a:t>
+            </a:r>
+            <a:r>
+              <a:rPr lang="ko-KR" altLang="en-US" sz="2800" dirty="0"/>
+              <a:t>코드를 </a:t>
+            </a:r>
+            <a:r>
+              <a:rPr lang="en-US" altLang="ko-KR" sz="2800" dirty="0"/>
+              <a:t>brian2</a:t>
+            </a:r>
+            <a:r>
+              <a:rPr lang="ko-KR" altLang="en-US" sz="2800" dirty="0"/>
+              <a:t>로 바꾼 코드</a:t>
+            </a:r>
+            <a:endParaRPr lang="en-US" altLang="ko-KR" sz="2800" dirty="0"/>
+          </a:p>
+          <a:p>
+            <a:pPr lvl="1"/>
+            <a:r>
+              <a:rPr lang="en-US" altLang="ko-KR" sz="2800" dirty="0"/>
+              <a:t>- </a:t>
+            </a:r>
+            <a:r>
+              <a:rPr lang="en-US" altLang="ko-KR" sz="2800" dirty="0" err="1"/>
+              <a:t>TypeError</a:t>
+            </a:r>
+            <a:r>
+              <a:rPr lang="en-US" altLang="ko-KR" sz="2800" dirty="0"/>
+              <a:t>: cannot pickle </a:t>
+            </a:r>
+            <a:r>
+              <a:rPr lang="en-US" altLang="ko-KR" sz="2800" dirty="0" err="1"/>
+              <a:t>weakref</a:t>
+            </a:r>
+            <a:r>
+              <a:rPr lang="en-US" altLang="ko-KR" sz="2800" dirty="0"/>
+              <a:t> object</a:t>
+            </a:r>
+          </a:p>
+        </p:txBody>
+      </p:sp>
     </p:spTree>
     <p:extLst>
       <p:ext uri="{BB962C8B-B14F-4D97-AF65-F5344CB8AC3E}">
@@ -6860,6 +7091,142 @@
           <a:chExt cx="0" cy="0"/>
         </a:xfrm>
       </p:grpSpPr>
+      <p:sp>
+        <p:nvSpPr>
+          <p:cNvPr id="2" name="TextBox 1">
+            <a:extLst>
+              <a:ext uri="{FF2B5EF4-FFF2-40B4-BE49-F238E27FC236}">
+                <a16:creationId xmlns:a16="http://schemas.microsoft.com/office/drawing/2014/main" id="{5DABC529-9A07-42BD-980E-A7E2393125E8}"/>
+              </a:ext>
+            </a:extLst>
+          </p:cNvPr>
+          <p:cNvSpPr txBox="1"/>
+          <p:nvPr/>
+        </p:nvSpPr>
+        <p:spPr>
+          <a:xfrm>
+            <a:off x="1603947" y="1443841"/>
+            <a:ext cx="9054060" cy="3970318"/>
+          </a:xfrm>
+          <a:prstGeom prst="rect">
+            <a:avLst/>
+          </a:prstGeom>
+          <a:noFill/>
+        </p:spPr>
+        <p:txBody>
+          <a:bodyPr wrap="square" rtlCol="0">
+            <a:spAutoFit/>
+          </a:bodyPr>
+          <a:lstStyle/>
+          <a:p>
+            <a:r>
+              <a:rPr lang="en-US" altLang="ko-KR" sz="2800" dirty="0" err="1"/>
+              <a:t>brng</a:t>
+            </a:r>
+            <a:r>
+              <a:rPr lang="en-US" altLang="ko-KR" sz="2800" dirty="0"/>
+              <a:t>_ - </a:t>
+            </a:r>
+            <a:r>
+              <a:rPr lang="ko-KR" altLang="en-US" sz="2800" dirty="0"/>
+              <a:t>보간</a:t>
+            </a:r>
+            <a:r>
+              <a:rPr lang="en-US" altLang="ko-KR" sz="2800" dirty="0"/>
+              <a:t>, </a:t>
+            </a:r>
+            <a:r>
+              <a:rPr lang="ko-KR" altLang="en-US" sz="2800" dirty="0"/>
+              <a:t>뉴런방정식</a:t>
+            </a:r>
+            <a:r>
+              <a:rPr lang="en-US" altLang="ko-KR" sz="2800" dirty="0"/>
+              <a:t>, </a:t>
+            </a:r>
+            <a:r>
+              <a:rPr lang="en-US" altLang="ko-KR" sz="2800" dirty="0" err="1"/>
+              <a:t>rowdata</a:t>
+            </a:r>
+            <a:r>
+              <a:rPr lang="en-US" altLang="ko-KR" sz="2800" dirty="0"/>
+              <a:t>, </a:t>
+            </a:r>
+            <a:r>
+              <a:rPr lang="en-US" altLang="ko-KR" sz="2800" dirty="0" err="1"/>
+              <a:t>rowj</a:t>
+            </a:r>
+            <a:r>
+              <a:rPr lang="en-US" altLang="ko-KR" sz="2800" dirty="0"/>
+              <a:t> </a:t>
+            </a:r>
+          </a:p>
+          <a:p>
+            <a:endParaRPr lang="en-US" altLang="ko-KR" sz="2800" dirty="0"/>
+          </a:p>
+          <a:p>
+            <a:pPr marL="342900" indent="-342900">
+              <a:buAutoNum type="arabicPeriod"/>
+            </a:pPr>
+            <a:r>
+              <a:rPr lang="ko-KR" altLang="en-US" sz="2800" dirty="0"/>
+              <a:t>위 요소가 코드에 문제를 일으키지 않도록 한 후 코드를 수정하여 실행되게 만든다</a:t>
+            </a:r>
+            <a:r>
+              <a:rPr lang="en-US" altLang="ko-KR" sz="2800" dirty="0"/>
+              <a:t>.</a:t>
+            </a:r>
+          </a:p>
+          <a:p>
+            <a:pPr marL="342900" indent="-342900">
+              <a:buAutoNum type="arabicPeriod"/>
+            </a:pPr>
+            <a:r>
+              <a:rPr lang="en-US" altLang="ko-KR" sz="2800" dirty="0"/>
+              <a:t>Brian2</a:t>
+            </a:r>
+            <a:r>
+              <a:rPr lang="ko-KR" altLang="en-US" sz="2800" dirty="0"/>
+              <a:t>를 이용해 논문의 내용을 구현한 소스코드를 작동시킨다</a:t>
+            </a:r>
+            <a:r>
+              <a:rPr lang="en-US" altLang="ko-KR" sz="2800" dirty="0"/>
+              <a:t>. </a:t>
+            </a:r>
+            <a:r>
+              <a:rPr lang="ko-KR" altLang="en-US" sz="2800" dirty="0"/>
+              <a:t>이 코드를 모두 이해한 후 개량한다</a:t>
+            </a:r>
+            <a:r>
+              <a:rPr lang="en-US" altLang="ko-KR" sz="2800" dirty="0"/>
+              <a:t>. </a:t>
+            </a:r>
+            <a:r>
+              <a:rPr lang="ko-KR" altLang="en-US" sz="2800" dirty="0"/>
+              <a:t>그 다음 위 요소들을 추가한다</a:t>
+            </a:r>
+            <a:r>
+              <a:rPr lang="en-US" altLang="ko-KR" sz="2800" dirty="0"/>
+              <a:t>.</a:t>
+            </a:r>
+          </a:p>
+          <a:p>
+            <a:pPr marL="342900" indent="-342900">
+              <a:buAutoNum type="arabicPeriod"/>
+            </a:pPr>
+            <a:endParaRPr lang="en-US" altLang="ko-KR" sz="2800" dirty="0"/>
+          </a:p>
+          <a:p>
+            <a:r>
+              <a:rPr lang="en-US" altLang="ko-KR" sz="2800" dirty="0"/>
+              <a:t>-&gt; 2</a:t>
+            </a:r>
+            <a:r>
+              <a:rPr lang="ko-KR" altLang="en-US" sz="2800" dirty="0"/>
+              <a:t>번 방식 선택</a:t>
+            </a:r>
+          </a:p>
+        </p:txBody>
+      </p:sp>
     </p:spTree>
     <p:extLst>
       <p:ext uri="{BB962C8B-B14F-4D97-AF65-F5344CB8AC3E}">
@@ -6890,6 +7257,36 @@
           <a:chExt cx="0" cy="0"/>
         </a:xfrm>
       </p:grpSpPr>
+      <p:pic>
+        <p:nvPicPr>
+          <p:cNvPr id="3" name="그림 2">
+            <a:extLst>
+              <a:ext uri="{FF2B5EF4-FFF2-40B4-BE49-F238E27FC236}">
+                <a16:creationId xmlns:a16="http://schemas.microsoft.com/office/drawing/2014/main" id="{F5D3D571-C85B-40BF-A1A1-B576235427C3}"/>
+              </a:ext>
+            </a:extLst>
+          </p:cNvPr>
+          <p:cNvPicPr>
+            <a:picLocks noChangeAspect="1"/>
+          </p:cNvPicPr>
+          <p:nvPr/>
+        </p:nvPicPr>
+        <p:blipFill>
+          <a:blip r:embed="rId2"/>
+          <a:stretch>
+            <a:fillRect/>
+          </a:stretch>
+        </p:blipFill>
+        <p:spPr>
+          <a:xfrm>
+            <a:off x="3232915" y="0"/>
+            <a:ext cx="5726169" cy="6858000"/>
+          </a:xfrm>
+          <a:prstGeom prst="rect">
+            <a:avLst/>
+          </a:prstGeom>
+        </p:spPr>
+      </p:pic>
     </p:spTree>
     <p:extLst>
       <p:ext uri="{BB962C8B-B14F-4D97-AF65-F5344CB8AC3E}">
@@ -6920,6 +7317,36 @@
           <a:chExt cx="0" cy="0"/>
         </a:xfrm>
       </p:grpSpPr>
+      <p:pic>
+        <p:nvPicPr>
+          <p:cNvPr id="3" name="그림 2">
+            <a:extLst>
+              <a:ext uri="{FF2B5EF4-FFF2-40B4-BE49-F238E27FC236}">
+                <a16:creationId xmlns:a16="http://schemas.microsoft.com/office/drawing/2014/main" id="{7AEF6F99-E87B-4E8B-B8EE-B60D0718C288}"/>
+              </a:ext>
+            </a:extLst>
+          </p:cNvPr>
+          <p:cNvPicPr>
+            <a:picLocks noChangeAspect="1"/>
+          </p:cNvPicPr>
+          <p:nvPr/>
+        </p:nvPicPr>
+        <p:blipFill>
+          <a:blip r:embed="rId2"/>
+          <a:stretch>
+            <a:fillRect/>
+          </a:stretch>
+        </p:blipFill>
+        <p:spPr>
+          <a:xfrm>
+            <a:off x="265974" y="559927"/>
+            <a:ext cx="11660052" cy="5976355"/>
+          </a:xfrm>
+          <a:prstGeom prst="rect">
+            <a:avLst/>
+          </a:prstGeom>
+        </p:spPr>
+      </p:pic>
     </p:spTree>
     <p:extLst>
       <p:ext uri="{BB962C8B-B14F-4D97-AF65-F5344CB8AC3E}">
@@ -6950,6 +7377,36 @@
           <a:chExt cx="0" cy="0"/>
         </a:xfrm>
       </p:grpSpPr>
+      <p:pic>
+        <p:nvPicPr>
+          <p:cNvPr id="3" name="그림 2">
+            <a:extLst>
+              <a:ext uri="{FF2B5EF4-FFF2-40B4-BE49-F238E27FC236}">
+                <a16:creationId xmlns:a16="http://schemas.microsoft.com/office/drawing/2014/main" id="{19791E5A-8EB0-47CA-B863-1431BD0D20ED}"/>
+              </a:ext>
+            </a:extLst>
+          </p:cNvPr>
+          <p:cNvPicPr>
+            <a:picLocks noChangeAspect="1"/>
+          </p:cNvPicPr>
+          <p:nvPr/>
+        </p:nvPicPr>
+        <p:blipFill>
+          <a:blip r:embed="rId2"/>
+          <a:stretch>
+            <a:fillRect/>
+          </a:stretch>
+        </p:blipFill>
+        <p:spPr>
+          <a:xfrm>
+            <a:off x="2004441" y="837838"/>
+            <a:ext cx="8183117" cy="5182323"/>
+          </a:xfrm>
+          <a:prstGeom prst="rect">
+            <a:avLst/>
+          </a:prstGeom>
+        </p:spPr>
+      </p:pic>
     </p:spTree>
     <p:extLst>
       <p:ext uri="{BB962C8B-B14F-4D97-AF65-F5344CB8AC3E}">

</xml_diff>